<commit_message>
fixes to the formating and changed the image for VS 2010
</commit_message>
<xml_diff>
--- a/2010/lectures/1. .NET Framework Overview.pptx
+++ b/2010/lectures/1. .NET Framework Overview.pptx
@@ -312,7 +312,7 @@
             <a:fld id="{3BF7C7B5-275F-4D1F-9AB4-9255447DBC73}" type="datetimeFigureOut">
               <a:rPr lang="en-US"/>
               <a:pPr/>
-              <a:t>10/5/2010</a:t>
+              <a:t>10/6/2010</a:t>
             </a:fld>
             <a:endParaRPr lang="en-US" dirty="0"/>
           </a:p>
@@ -543,7 +543,7 @@
             <a:fld id="{9B46F231-FB2B-4655-A644-E2477325E686}" type="datetimeFigureOut">
               <a:rPr lang="en-US"/>
               <a:pPr/>
-              <a:t>10/5/2010</a:t>
+              <a:t>10/6/2010</a:t>
             </a:fld>
             <a:endParaRPr lang="en-US" dirty="0"/>
           </a:p>
@@ -12320,7 +12320,11 @@
           <a:bodyPr/>
           <a:lstStyle/>
           <a:p>
-            <a:pPr marL="622300" lvl="1" indent="-260350"/>
+            <a:pPr marL="622300" lvl="1" indent="-260350">
+              <a:lnSpc>
+                <a:spcPct val="100000"/>
+              </a:lnSpc>
+            </a:pPr>
             <a:r>
               <a:rPr lang="en-US" dirty="0"/>
               <a:t>Rich object-oriented library with fundamental classes</a:t>
@@ -12332,7 +12336,11 @@
             <a:endParaRPr lang="en-US" dirty="0"/>
           </a:p>
           <a:p>
-            <a:pPr marL="622300" lvl="1" indent="-260350"/>
+            <a:pPr marL="622300" lvl="1" indent="-260350">
+              <a:lnSpc>
+                <a:spcPct val="100000"/>
+              </a:lnSpc>
+            </a:pPr>
             <a:r>
               <a:rPr lang="en-US" dirty="0" smtClean="0"/>
               <a:t>Input-output, collections</a:t>
@@ -13147,9 +13155,6 @@
           <a:lstStyle/>
           <a:p>
             <a:pPr marL="622300" lvl="1" indent="-260350" eaLnBrk="0" hangingPunct="0">
-              <a:lnSpc>
-                <a:spcPts val="3800"/>
-              </a:lnSpc>
               <a:spcBef>
                 <a:spcPts val="600"/>
               </a:spcBef>
@@ -13184,9 +13189,6 @@
           </a:p>
           <a:p>
             <a:pPr marL="622300" lvl="1" indent="-260350" eaLnBrk="0" hangingPunct="0">
-              <a:lnSpc>
-                <a:spcPts val="3800"/>
-              </a:lnSpc>
               <a:spcBef>
                 <a:spcPts val="600"/>
               </a:spcBef>
@@ -13221,9 +13223,6 @@
           </a:p>
           <a:p>
             <a:pPr marL="622300" lvl="1" indent="-260350" eaLnBrk="0" hangingPunct="0">
-              <a:lnSpc>
-                <a:spcPts val="3800"/>
-              </a:lnSpc>
               <a:spcBef>
                 <a:spcPts val="600"/>
               </a:spcBef>
@@ -14167,9 +14166,6 @@
           <a:lstStyle/>
           <a:p>
             <a:pPr marL="622300" lvl="1" indent="-260350" eaLnBrk="0" hangingPunct="0">
-              <a:lnSpc>
-                <a:spcPts val="3800"/>
-              </a:lnSpc>
               <a:spcBef>
                 <a:spcPts val="600"/>
               </a:spcBef>
@@ -15327,9 +15323,6 @@
           <a:lstStyle/>
           <a:p>
             <a:pPr marL="622300" lvl="1" indent="-260350" eaLnBrk="0" hangingPunct="0">
-              <a:lnSpc>
-                <a:spcPts val="3800"/>
-              </a:lnSpc>
               <a:spcBef>
                 <a:spcPts val="600"/>
               </a:spcBef>
@@ -17373,9 +17366,6 @@
           <a:lstStyle/>
           <a:p>
             <a:pPr marL="622300" lvl="1" indent="-260350" eaLnBrk="0" hangingPunct="0">
-              <a:lnSpc>
-                <a:spcPts val="3800"/>
-              </a:lnSpc>
               <a:spcBef>
                 <a:spcPts val="600"/>
               </a:spcBef>
@@ -18483,6 +18473,11 @@
           <a:bodyPr/>
           <a:lstStyle/>
           <a:p>
+            <a:pPr>
+              <a:lnSpc>
+                <a:spcPct val="100000"/>
+              </a:lnSpc>
+            </a:pPr>
             <a:r>
               <a:rPr lang="en-US" dirty="0">
                 <a:solidFill>
@@ -18491,11 +18486,6 @@
                     <a:lumOff val="80000"/>
                   </a:schemeClr>
                 </a:solidFill>
-                <a:effectLst>
-                  <a:outerShdw blurRad="38100" dist="38100" dir="2700000" algn="tl">
-                    <a:srgbClr val="000000"/>
-                  </a:outerShdw>
-                </a:effectLst>
               </a:rPr>
               <a:t>Managed </a:t>
             </a:r>
@@ -18507,11 +18497,6 @@
                     <a:lumOff val="80000"/>
                   </a:schemeClr>
                 </a:solidFill>
-                <a:effectLst>
-                  <a:outerShdw blurRad="38100" dist="38100" dir="2700000" algn="tl">
-                    <a:srgbClr val="000000"/>
-                  </a:outerShdw>
-                </a:effectLst>
               </a:rPr>
               <a:t>execution environment</a:t>
             </a:r>
@@ -18522,15 +18507,14 @@
                   <a:lumOff val="80000"/>
                 </a:schemeClr>
               </a:solidFill>
-              <a:effectLst>
-                <a:outerShdw blurRad="38100" dist="38100" dir="2700000" algn="tl">
-                  <a:srgbClr val="000000"/>
-                </a:outerShdw>
-              </a:effectLst>
             </a:endParaRPr>
           </a:p>
           <a:p>
-            <a:pPr lvl="1"/>
+            <a:pPr lvl="1">
+              <a:lnSpc>
+                <a:spcPct val="100000"/>
+              </a:lnSpc>
+            </a:pPr>
             <a:r>
               <a:rPr lang="en-US" dirty="0" smtClean="0"/>
               <a:t>Controls the </a:t>
@@ -18554,6 +18538,11 @@
             <a:endParaRPr lang="bg-BG" dirty="0"/>
           </a:p>
           <a:p>
+            <a:pPr>
+              <a:lnSpc>
+                <a:spcPct val="100000"/>
+              </a:lnSpc>
+            </a:pPr>
             <a:r>
               <a:rPr lang="en-US" dirty="0"/>
               <a:t>Something like virtual </a:t>
@@ -18564,7 +18553,11 @@
             </a:r>
           </a:p>
           <a:p>
-            <a:pPr lvl="1"/>
+            <a:pPr lvl="1">
+              <a:lnSpc>
+                <a:spcPct val="100000"/>
+              </a:lnSpc>
+            </a:pPr>
             <a:r>
               <a:rPr lang="en-US" dirty="0" smtClean="0"/>
               <a:t>Like the Java </a:t>
@@ -18580,6 +18573,11 @@
             <a:endParaRPr lang="en-US" dirty="0"/>
           </a:p>
           <a:p>
+            <a:pPr>
+              <a:lnSpc>
+                <a:spcPct val="100000"/>
+              </a:lnSpc>
+            </a:pPr>
             <a:r>
               <a:rPr lang="en-US" dirty="0"/>
               <a:t>Not an </a:t>
@@ -18590,14 +18588,22 @@
             </a:r>
           </a:p>
           <a:p>
-            <a:pPr lvl="1"/>
+            <a:pPr lvl="1">
+              <a:lnSpc>
+                <a:spcPct val="100000"/>
+              </a:lnSpc>
+            </a:pPr>
             <a:r>
               <a:rPr lang="en-US" dirty="0" smtClean="0"/>
               <a:t>Compilation on-demand is used</a:t>
             </a:r>
           </a:p>
           <a:p>
-            <a:pPr lvl="2"/>
+            <a:pPr lvl="2">
+              <a:lnSpc>
+                <a:spcPct val="100000"/>
+              </a:lnSpc>
+            </a:pPr>
             <a:r>
               <a:rPr lang="en-US" dirty="0" smtClean="0"/>
               <a:t>Known as </a:t>
@@ -18645,6 +18651,11 @@
             </a:endParaRPr>
           </a:p>
           <a:p>
+            <a:pPr>
+              <a:lnSpc>
+                <a:spcPct val="100000"/>
+              </a:lnSpc>
+            </a:pPr>
             <a:r>
               <a:rPr lang="en-US" dirty="0"/>
               <a:t>Possible compilation in advance</a:t>
@@ -18781,6 +18792,9 @@
           <a:lstStyle/>
           <a:p>
             <a:pPr>
+              <a:lnSpc>
+                <a:spcPct val="100000"/>
+              </a:lnSpc>
               <a:spcBef>
                 <a:spcPct val="35000"/>
               </a:spcBef>
@@ -18821,6 +18835,9 @@
           </a:p>
           <a:p>
             <a:pPr>
+              <a:lnSpc>
+                <a:spcPct val="100000"/>
+              </a:lnSpc>
               <a:spcBef>
                 <a:spcPct val="35000"/>
               </a:spcBef>
@@ -18833,6 +18850,9 @@
           </a:p>
           <a:p>
             <a:pPr>
+              <a:lnSpc>
+                <a:spcPct val="100000"/>
+              </a:lnSpc>
               <a:spcBef>
                 <a:spcPct val="35000"/>
               </a:spcBef>
@@ -18845,6 +18865,9 @@
           </a:p>
           <a:p>
             <a:pPr>
+              <a:lnSpc>
+                <a:spcPct val="100000"/>
+              </a:lnSpc>
               <a:spcBef>
                 <a:spcPct val="35000"/>
               </a:spcBef>
@@ -18857,6 +18880,9 @@
           </a:p>
           <a:p>
             <a:pPr>
+              <a:lnSpc>
+                <a:spcPct val="100000"/>
+              </a:lnSpc>
               <a:spcBef>
                 <a:spcPct val="35000"/>
               </a:spcBef>
@@ -18868,6 +18894,9 @@
           </a:p>
           <a:p>
             <a:pPr lvl="1">
+              <a:lnSpc>
+                <a:spcPct val="100000"/>
+              </a:lnSpc>
               <a:spcBef>
                 <a:spcPct val="35000"/>
               </a:spcBef>
@@ -18879,6 +18908,9 @@
           </a:p>
           <a:p>
             <a:pPr lvl="1">
+              <a:lnSpc>
+                <a:spcPct val="100000"/>
+              </a:lnSpc>
               <a:spcBef>
                 <a:spcPct val="35000"/>
               </a:spcBef>
@@ -20576,6 +20608,11 @@
           <a:bodyPr/>
           <a:lstStyle/>
           <a:p>
+            <a:pPr>
+              <a:lnSpc>
+                <a:spcPct val="100000"/>
+              </a:lnSpc>
+            </a:pPr>
             <a:r>
               <a:rPr lang="en-US" dirty="0" smtClean="0"/>
               <a:t>CLR </a:t>
@@ -20609,6 +20646,11 @@
             </a:endParaRPr>
           </a:p>
           <a:p>
+            <a:pPr>
+              <a:lnSpc>
+                <a:spcPct val="100000"/>
+              </a:lnSpc>
+            </a:pPr>
             <a:r>
               <a:rPr lang="en-US" dirty="0"/>
               <a:t>Represents programming code in the low level language </a:t>
@@ -20638,6 +20680,11 @@
             </a:r>
           </a:p>
           <a:p>
+            <a:pPr>
+              <a:lnSpc>
+                <a:spcPct val="100000"/>
+              </a:lnSpc>
+            </a:pPr>
             <a:r>
               <a:rPr lang="en-US" dirty="0" smtClean="0"/>
               <a:t>Contains metadata</a:t>
@@ -20645,7 +20692,11 @@
             <a:endParaRPr lang="bg-BG" dirty="0"/>
           </a:p>
           <a:p>
-            <a:pPr lvl="1"/>
+            <a:pPr lvl="1">
+              <a:lnSpc>
+                <a:spcPct val="100000"/>
+              </a:lnSpc>
+            </a:pPr>
             <a:r>
               <a:rPr lang="en-US" dirty="0"/>
               <a:t>Description of classes</a:t>
@@ -20693,6 +20744,11 @@
             <a:endParaRPr lang="bg-BG" dirty="0"/>
           </a:p>
           <a:p>
+            <a:pPr>
+              <a:lnSpc>
+                <a:spcPct val="100000"/>
+              </a:lnSpc>
+            </a:pPr>
             <a:r>
               <a:rPr lang="en-US" dirty="0" smtClean="0"/>
               <a:t>Programs</a:t>
@@ -20719,7 +20775,11 @@
             </a:r>
           </a:p>
           <a:p>
-            <a:pPr lvl="1"/>
+            <a:pPr lvl="1">
+              <a:lnSpc>
+                <a:spcPct val="100000"/>
+              </a:lnSpc>
+            </a:pPr>
             <a:r>
               <a:rPr lang="en-US" dirty="0" smtClean="0"/>
               <a:t>Compiled </a:t>
@@ -20742,7 +20802,11 @@
             </a:r>
           </a:p>
           <a:p>
-            <a:pPr lvl="1"/>
+            <a:pPr lvl="1">
+              <a:lnSpc>
+                <a:spcPct val="100000"/>
+              </a:lnSpc>
+            </a:pPr>
             <a:r>
               <a:rPr lang="en-US" dirty="0" smtClean="0"/>
               <a:t>Packaged as assemblies (</a:t>
@@ -21092,7 +21156,7 @@
           <a:p>
             <a:pPr>
               <a:lnSpc>
-                <a:spcPct val="105000"/>
+                <a:spcPct val="100000"/>
               </a:lnSpc>
             </a:pPr>
             <a:r>
@@ -21108,7 +21172,7 @@
           <a:p>
             <a:pPr lvl="1">
               <a:lnSpc>
-                <a:spcPct val="105000"/>
+                <a:spcPct val="100000"/>
               </a:lnSpc>
             </a:pPr>
             <a:r>
@@ -21120,7 +21184,7 @@
           <a:p>
             <a:pPr lvl="1">
               <a:lnSpc>
-                <a:spcPct val="105000"/>
+                <a:spcPct val="100000"/>
               </a:lnSpc>
             </a:pPr>
             <a:r>
@@ -21135,7 +21199,7 @@
           <a:p>
             <a:pPr>
               <a:lnSpc>
-                <a:spcPct val="105000"/>
+                <a:spcPct val="100000"/>
               </a:lnSpc>
             </a:pPr>
             <a:r>
@@ -21154,7 +21218,7 @@
           <a:p>
             <a:pPr lvl="1">
               <a:lnSpc>
-                <a:spcPct val="105000"/>
+                <a:spcPct val="100000"/>
               </a:lnSpc>
             </a:pPr>
             <a:r>
@@ -21166,7 +21230,7 @@
           <a:p>
             <a:pPr>
               <a:lnSpc>
-                <a:spcPct val="105000"/>
+                <a:spcPct val="100000"/>
               </a:lnSpc>
             </a:pPr>
             <a:r>
@@ -21181,7 +21245,7 @@
           <a:p>
             <a:pPr lvl="1">
               <a:lnSpc>
-                <a:spcPct val="105000"/>
+                <a:spcPct val="100000"/>
               </a:lnSpc>
             </a:pPr>
             <a:r>
@@ -21193,7 +21257,7 @@
           <a:p>
             <a:pPr lvl="1">
               <a:lnSpc>
-                <a:spcPct val="105000"/>
+                <a:spcPct val="100000"/>
               </a:lnSpc>
             </a:pPr>
             <a:r>
@@ -21309,11 +21373,6 @@
                     <a:lumOff val="80000"/>
                   </a:schemeClr>
                 </a:solidFill>
-                <a:effectLst>
-                  <a:outerShdw blurRad="38100" dist="38100" dir="2700000" algn="tl">
-                    <a:srgbClr val="000000"/>
-                  </a:outerShdw>
-                </a:effectLst>
               </a:rPr>
               <a:t>managed </a:t>
             </a:r>
@@ -21325,11 +21384,6 @@
                     <a:lumOff val="80000"/>
                   </a:schemeClr>
                 </a:solidFill>
-                <a:effectLst>
-                  <a:outerShdw blurRad="38100" dist="38100" dir="2700000" algn="tl">
-                    <a:srgbClr val="000000"/>
-                  </a:outerShdw>
-                </a:effectLst>
               </a:rPr>
               <a:t>heap</a:t>
             </a:r>
@@ -21356,11 +21410,6 @@
                     <a:lumOff val="80000"/>
                   </a:schemeClr>
                 </a:solidFill>
-                <a:effectLst>
-                  <a:outerShdw blurRad="38100" dist="38100" dir="2700000" algn="tl">
-                    <a:srgbClr val="000000"/>
-                  </a:outerShdw>
-                </a:effectLst>
               </a:rPr>
               <a:t>garbage </a:t>
             </a:r>
@@ -21372,11 +21421,6 @@
                     <a:lumOff val="80000"/>
                   </a:schemeClr>
                 </a:solidFill>
-                <a:effectLst>
-                  <a:outerShdw blurRad="38100" dist="38100" dir="2700000" algn="tl">
-                    <a:srgbClr val="000000"/>
-                  </a:outerShdw>
-                </a:effectLst>
               </a:rPr>
               <a:t>collector</a:t>
             </a:r>
@@ -21640,6 +21684,11 @@
           <a:bodyPr/>
           <a:lstStyle/>
           <a:p>
+            <a:pPr>
+              <a:lnSpc>
+                <a:spcPct val="100000"/>
+              </a:lnSpc>
+            </a:pPr>
             <a:r>
               <a:rPr lang="en-US" dirty="0"/>
               <a:t>Low level language</a:t>
@@ -21663,6 +21712,11 @@
             <a:endParaRPr lang="en-US" dirty="0"/>
           </a:p>
           <a:p>
+            <a:pPr>
+              <a:lnSpc>
+                <a:spcPct val="100000"/>
+              </a:lnSpc>
+            </a:pPr>
             <a:r>
               <a:rPr lang="en-US" dirty="0" smtClean="0"/>
               <a:t>Has </a:t>
@@ -21678,7 +21732,11 @@
             <a:endParaRPr lang="en-US" dirty="0"/>
           </a:p>
           <a:p>
-            <a:pPr lvl="1"/>
+            <a:pPr lvl="1">
+              <a:lnSpc>
+                <a:spcPct val="100000"/>
+              </a:lnSpc>
+            </a:pPr>
             <a:r>
               <a:rPr lang="en-US" dirty="0" smtClean="0"/>
               <a:t>Loading and storing data, calling </a:t>
@@ -21689,21 +21747,33 @@
             </a:r>
           </a:p>
           <a:p>
-            <a:pPr lvl="1"/>
+            <a:pPr lvl="1">
+              <a:lnSpc>
+                <a:spcPct val="100000"/>
+              </a:lnSpc>
+            </a:pPr>
             <a:r>
               <a:rPr lang="en-US" dirty="0"/>
               <a:t>Arithmetic and logical operations</a:t>
             </a:r>
           </a:p>
           <a:p>
-            <a:pPr lvl="1"/>
+            <a:pPr lvl="1">
+              <a:lnSpc>
+                <a:spcPct val="100000"/>
+              </a:lnSpc>
+            </a:pPr>
             <a:r>
               <a:rPr lang="en-US" dirty="0" smtClean="0"/>
               <a:t>Exception handling</a:t>
             </a:r>
           </a:p>
           <a:p>
-            <a:pPr lvl="1"/>
+            <a:pPr lvl="1">
+              <a:lnSpc>
+                <a:spcPct val="100000"/>
+              </a:lnSpc>
+            </a:pPr>
             <a:r>
               <a:rPr lang="en-US" dirty="0" smtClean="0"/>
               <a:t>Etc.</a:t>
@@ -21711,6 +21781,11 @@
             <a:endParaRPr lang="bg-BG" dirty="0"/>
           </a:p>
           <a:p>
+            <a:pPr>
+              <a:lnSpc>
+                <a:spcPct val="100000"/>
+              </a:lnSpc>
+            </a:pPr>
             <a:r>
               <a:rPr lang="en-US" dirty="0"/>
               <a:t>MSIL </a:t>
@@ -26864,8 +26939,8 @@
         </p:nvSpPr>
         <p:spPr>
           <a:xfrm>
-            <a:off x="228600" y="914400"/>
-            <a:ext cx="8720138" cy="5719763"/>
+            <a:off x="228600" y="838200"/>
+            <a:ext cx="8720138" cy="5867400"/>
           </a:xfrm>
         </p:spPr>
         <p:txBody>
@@ -26874,7 +26949,7 @@
           <a:p>
             <a:pPr>
               <a:lnSpc>
-                <a:spcPct val="95000"/>
+                <a:spcPct val="100000"/>
               </a:lnSpc>
             </a:pPr>
             <a:r>
@@ -26885,7 +26960,7 @@
           <a:p>
             <a:pPr lvl="1">
               <a:lnSpc>
-                <a:spcPct val="95000"/>
+                <a:spcPct val="100000"/>
               </a:lnSpc>
             </a:pPr>
             <a:r>
@@ -26896,7 +26971,7 @@
           <a:p>
             <a:pPr lvl="2">
               <a:lnSpc>
-                <a:spcPct val="95000"/>
+                <a:spcPct val="100000"/>
               </a:lnSpc>
             </a:pPr>
             <a:r>
@@ -26907,7 +26982,7 @@
           <a:p>
             <a:pPr lvl="1">
               <a:lnSpc>
-                <a:spcPct val="95000"/>
+                <a:spcPct val="100000"/>
               </a:lnSpc>
             </a:pPr>
             <a:r>
@@ -26918,7 +26993,7 @@
           <a:p>
             <a:pPr lvl="1">
               <a:lnSpc>
-                <a:spcPct val="95000"/>
+                <a:spcPct val="100000"/>
               </a:lnSpc>
             </a:pPr>
             <a:r>
@@ -26933,7 +27008,7 @@
           <a:p>
             <a:pPr lvl="1">
               <a:lnSpc>
-                <a:spcPct val="95000"/>
+                <a:spcPct val="100000"/>
               </a:lnSpc>
             </a:pPr>
             <a:r>
@@ -26944,7 +27019,7 @@
           <a:p>
             <a:pPr>
               <a:lnSpc>
-                <a:spcPct val="95000"/>
+                <a:spcPct val="100000"/>
               </a:lnSpc>
             </a:pPr>
             <a:r>
@@ -26955,7 +27030,7 @@
           <a:p>
             <a:pPr lvl="1">
               <a:lnSpc>
-                <a:spcPct val="95000"/>
+                <a:spcPct val="100000"/>
               </a:lnSpc>
             </a:pPr>
             <a:r>
@@ -26975,7 +27050,7 @@
           <a:p>
             <a:pPr lvl="1">
               <a:lnSpc>
-                <a:spcPct val="95000"/>
+                <a:spcPct val="100000"/>
               </a:lnSpc>
             </a:pPr>
             <a:r>
@@ -27069,13 +27144,22 @@
           <a:bodyPr/>
           <a:lstStyle/>
           <a:p>
+            <a:pPr>
+              <a:lnSpc>
+                <a:spcPct val="100000"/>
+              </a:lnSpc>
+            </a:pPr>
             <a:r>
               <a:rPr lang="en-US" dirty="0" smtClean="0"/>
               <a:t>Metadata in the .NET assemblies</a:t>
             </a:r>
           </a:p>
           <a:p>
-            <a:pPr lvl="1"/>
+            <a:pPr lvl="1">
+              <a:lnSpc>
+                <a:spcPct val="100000"/>
+              </a:lnSpc>
+            </a:pPr>
             <a:r>
               <a:rPr lang="en-US" dirty="0" smtClean="0"/>
               <a:t>Data </a:t>
@@ -27091,7 +27175,11 @@
             <a:endParaRPr lang="en-US" dirty="0"/>
           </a:p>
           <a:p>
-            <a:pPr lvl="1"/>
+            <a:pPr lvl="1">
+              <a:lnSpc>
+                <a:spcPct val="100000"/>
+              </a:lnSpc>
+            </a:pPr>
             <a:r>
               <a:rPr lang="en-US" dirty="0" smtClean="0"/>
               <a:t>Integral part </a:t>
@@ -27107,7 +27195,11 @@
             <a:endParaRPr lang="en-US" dirty="0"/>
           </a:p>
           <a:p>
-            <a:pPr lvl="1"/>
+            <a:pPr lvl="1">
+              <a:lnSpc>
+                <a:spcPct val="100000"/>
+              </a:lnSpc>
+            </a:pPr>
             <a:r>
               <a:rPr lang="en-US" dirty="0"/>
               <a:t>Generated by </a:t>
@@ -27119,7 +27211,11 @@
             <a:endParaRPr lang="en-US" dirty="0"/>
           </a:p>
           <a:p>
-            <a:pPr lvl="1"/>
+            <a:pPr lvl="1">
+              <a:lnSpc>
+                <a:spcPct val="100000"/>
+              </a:lnSpc>
+            </a:pPr>
             <a:r>
               <a:rPr lang="en-US" dirty="0"/>
               <a:t>Describes all </a:t>
@@ -28168,6 +28264,11 @@
           <a:bodyPr/>
           <a:lstStyle/>
           <a:p>
+            <a:pPr>
+              <a:lnSpc>
+                <a:spcPct val="100000"/>
+              </a:lnSpc>
+            </a:pPr>
             <a:r>
               <a:rPr lang="en-US" dirty="0" smtClean="0"/>
               <a:t>Configurable </a:t>
@@ -28183,12 +28284,22 @@
             <a:endParaRPr lang="bg-BG" dirty="0"/>
           </a:p>
           <a:p>
+            <a:pPr>
+              <a:lnSpc>
+                <a:spcPct val="100000"/>
+              </a:lnSpc>
+            </a:pPr>
             <a:r>
               <a:rPr lang="en-US" dirty="0"/>
               <a:t>Consist of one or more assemblies</a:t>
             </a:r>
           </a:p>
           <a:p>
+            <a:pPr>
+              <a:lnSpc>
+                <a:spcPct val="100000"/>
+              </a:lnSpc>
+            </a:pPr>
             <a:r>
               <a:rPr lang="en-US" dirty="0"/>
               <a:t>Installed by </a:t>
@@ -28199,7 +28310,11 @@
             </a:r>
           </a:p>
           <a:p>
-            <a:pPr lvl="1"/>
+            <a:pPr lvl="1">
+              <a:lnSpc>
+                <a:spcPct val="100000"/>
+              </a:lnSpc>
+            </a:pPr>
             <a:r>
               <a:rPr lang="en-US" dirty="0" smtClean="0"/>
               <a:t>No </a:t>
@@ -28214,6 +28329,11 @@
             </a:r>
           </a:p>
           <a:p>
+            <a:pPr>
+              <a:lnSpc>
+                <a:spcPct val="100000"/>
+              </a:lnSpc>
+            </a:pPr>
             <a:r>
               <a:rPr lang="en-US" dirty="0" smtClean="0"/>
               <a:t>Different </a:t>
@@ -28225,7 +28345,11 @@
             <a:endParaRPr lang="bg-BG" dirty="0"/>
           </a:p>
           <a:p>
-            <a:pPr lvl="1"/>
+            <a:pPr lvl="1">
+              <a:lnSpc>
+                <a:spcPct val="100000"/>
+              </a:lnSpc>
+            </a:pPr>
             <a:r>
               <a:rPr lang="en-US" dirty="0"/>
               <a:t>No </a:t>
@@ -28237,6 +28361,11 @@
             <a:endParaRPr lang="bg-BG" dirty="0"/>
           </a:p>
           <a:p>
+            <a:pPr>
+              <a:lnSpc>
+                <a:spcPct val="100000"/>
+              </a:lnSpc>
+            </a:pPr>
             <a:r>
               <a:rPr lang="en-US" dirty="0"/>
               <a:t>Easy installation</a:t>
@@ -28465,13 +28594,22 @@
           <a:bodyPr/>
           <a:lstStyle/>
           <a:p>
+            <a:pPr>
+              <a:lnSpc>
+                <a:spcPct val="100000"/>
+              </a:lnSpc>
+            </a:pPr>
             <a:r>
               <a:rPr lang="en-US" dirty="0" smtClean="0"/>
               <a:t>Common Language Infrastructure (CLI)</a:t>
             </a:r>
           </a:p>
           <a:p>
-            <a:pPr lvl="1"/>
+            <a:pPr lvl="1">
+              <a:lnSpc>
+                <a:spcPct val="100000"/>
+              </a:lnSpc>
+            </a:pPr>
             <a:r>
               <a:rPr lang="en-US" dirty="0" smtClean="0"/>
               <a:t>Open </a:t>
@@ -28482,7 +28620,11 @@
             </a:r>
           </a:p>
           <a:p>
-            <a:pPr lvl="1"/>
+            <a:pPr lvl="1">
+              <a:lnSpc>
+                <a:spcPct val="100000"/>
+              </a:lnSpc>
+            </a:pPr>
             <a:r>
               <a:rPr lang="en-US" dirty="0"/>
               <a:t>Multiple high-level languages </a:t>
@@ -28502,14 +28644,22 @@
             <a:endParaRPr lang="en-US" dirty="0"/>
           </a:p>
           <a:p>
-            <a:pPr lvl="1"/>
+            <a:pPr lvl="1">
+              <a:lnSpc>
+                <a:spcPct val="100000"/>
+              </a:lnSpc>
+            </a:pPr>
             <a:r>
               <a:rPr lang="en-US" dirty="0"/>
               <a:t>Standardized part of CLR</a:t>
             </a:r>
           </a:p>
           <a:p>
-            <a:pPr lvl="1"/>
+            <a:pPr lvl="1">
+              <a:lnSpc>
+                <a:spcPct val="100000"/>
+              </a:lnSpc>
+            </a:pPr>
             <a:r>
               <a:rPr lang="en-US" dirty="0"/>
               <a:t>.NET Framework is </a:t>
@@ -28520,7 +28670,11 @@
             </a:r>
           </a:p>
           <a:p>
-            <a:pPr lvl="1"/>
+            <a:pPr lvl="1">
+              <a:lnSpc>
+                <a:spcPct val="100000"/>
+              </a:lnSpc>
+            </a:pPr>
             <a:r>
               <a:rPr lang="en-US" dirty="0" smtClean="0"/>
               <a:t>Mono is CLI implementation for Linux</a:t>
@@ -28612,7 +28766,7 @@
           <a:p>
             <a:pPr>
               <a:lnSpc>
-                <a:spcPct val="105000"/>
+                <a:spcPct val="100000"/>
               </a:lnSpc>
               <a:spcBef>
                 <a:spcPct val="35000"/>
@@ -28631,7 +28785,7 @@
           <a:p>
             <a:pPr lvl="1">
               <a:lnSpc>
-                <a:spcPct val="105000"/>
+                <a:spcPct val="100000"/>
               </a:lnSpc>
               <a:spcBef>
                 <a:spcPct val="35000"/>
@@ -28645,7 +28799,7 @@
           <a:p>
             <a:pPr lvl="1">
               <a:lnSpc>
-                <a:spcPct val="105000"/>
+                <a:spcPct val="100000"/>
               </a:lnSpc>
               <a:spcBef>
                 <a:spcPct val="35000"/>
@@ -28660,7 +28814,7 @@
           <a:p>
             <a:pPr lvl="1">
               <a:lnSpc>
-                <a:spcPct val="105000"/>
+                <a:spcPct val="100000"/>
               </a:lnSpc>
               <a:spcBef>
                 <a:spcPct val="35000"/>
@@ -28674,7 +28828,7 @@
           <a:p>
             <a:pPr lvl="1">
               <a:lnSpc>
-                <a:spcPct val="105000"/>
+                <a:spcPct val="100000"/>
               </a:lnSpc>
               <a:spcBef>
                 <a:spcPct val="35000"/>
@@ -28689,14 +28843,6 @@
               <a:t>)</a:t>
             </a:r>
             <a:endParaRPr lang="en-US" dirty="0"/>
-          </a:p>
-          <a:p>
-            <a:pPr>
-              <a:spcBef>
-                <a:spcPct val="35000"/>
-              </a:spcBef>
-            </a:pPr>
-            <a:endParaRPr lang="bg-BG" dirty="0"/>
           </a:p>
         </p:txBody>
       </p:sp>
@@ -29021,6 +29167,11 @@
           <a:bodyPr/>
           <a:lstStyle/>
           <a:p>
+            <a:pPr>
+              <a:lnSpc>
+                <a:spcPct val="100000"/>
+              </a:lnSpc>
+            </a:pPr>
             <a:r>
               <a:rPr lang="en-US" dirty="0" smtClean="0"/>
               <a:t>CTS defines the CLR</a:t>
@@ -29036,6 +29187,11 @@
             <a:endParaRPr lang="bg-BG" dirty="0"/>
           </a:p>
           <a:p>
+            <a:pPr>
+              <a:lnSpc>
+                <a:spcPct val="100000"/>
+              </a:lnSpc>
+            </a:pPr>
             <a:r>
               <a:rPr lang="en-US" dirty="0"/>
               <a:t>Ensures </a:t>
@@ -29058,7 +29214,11 @@
             </a:r>
           </a:p>
           <a:p>
-            <a:pPr lvl="1"/>
+            <a:pPr lvl="1">
+              <a:lnSpc>
+                <a:spcPct val="100000"/>
+              </a:lnSpc>
+            </a:pPr>
             <a:r>
               <a:rPr lang="en-US" dirty="0" smtClean="0"/>
               <a:t>E.g. </a:t>
@@ -29071,11 +29231,6 @@
                     <a:lumOff val="80000"/>
                   </a:schemeClr>
                 </a:solidFill>
-                <a:effectLst>
-                  <a:outerShdw blurRad="38100" dist="38100" dir="2700000" algn="tl">
-                    <a:srgbClr val="000000"/>
-                  </a:outerShdw>
-                </a:effectLst>
                 <a:latin typeface="Consolas" pitchFamily="49" charset="0"/>
                 <a:cs typeface="Consolas" pitchFamily="49" charset="0"/>
               </a:rPr>
@@ -29125,11 +29280,6 @@
                     <a:lumOff val="80000"/>
                   </a:schemeClr>
                 </a:solidFill>
-                <a:effectLst>
-                  <a:outerShdw blurRad="38100" dist="38100" dir="2700000" algn="tl">
-                    <a:srgbClr val="000000"/>
-                  </a:outerShdw>
-                </a:effectLst>
                 <a:latin typeface="Consolas" pitchFamily="49" charset="0"/>
                 <a:cs typeface="Consolas" pitchFamily="49" charset="0"/>
               </a:rPr>
@@ -29169,6 +29319,11 @@
             </a:r>
           </a:p>
           <a:p>
+            <a:pPr>
+              <a:lnSpc>
+                <a:spcPct val="100000"/>
+              </a:lnSpc>
+            </a:pPr>
             <a:r>
               <a:rPr lang="en-US" dirty="0"/>
               <a:t>Value </a:t>
@@ -29188,6 +29343,11 @@
             <a:endParaRPr lang="en-US" dirty="0"/>
           </a:p>
           <a:p>
+            <a:pPr>
+              <a:lnSpc>
+                <a:spcPct val="100000"/>
+              </a:lnSpc>
+            </a:pPr>
             <a:r>
               <a:rPr lang="en-US" dirty="0"/>
               <a:t>All types derive from</a:t>
@@ -30113,7 +30273,11 @@
           <a:bodyPr/>
           <a:lstStyle/>
           <a:p>
-            <a:pPr marL="357188" indent="-357188"/>
+            <a:pPr marL="357188" indent="-357188">
+              <a:lnSpc>
+                <a:spcPct val="100000"/>
+              </a:lnSpc>
+            </a:pPr>
             <a:r>
               <a:rPr lang="en-US" dirty="0" smtClean="0"/>
               <a:t>C</a:t>
@@ -30136,7 +30300,11 @@
             </a:r>
           </a:p>
           <a:p>
-            <a:pPr marL="357188" indent="-357188"/>
+            <a:pPr marL="357188" indent="-357188">
+              <a:lnSpc>
+                <a:spcPct val="100000"/>
+              </a:lnSpc>
+            </a:pPr>
             <a:r>
               <a:rPr lang="en-US" dirty="0" smtClean="0"/>
               <a:t>Example of C# program:</a:t>
@@ -30207,9 +30375,6 @@
           <a:lstStyle/>
           <a:p>
             <a:pPr eaLnBrk="0" hangingPunct="0">
-              <a:lnSpc>
-                <a:spcPct val="100000"/>
-              </a:lnSpc>
               <a:spcBef>
                 <a:spcPts val="0"/>
               </a:spcBef>
@@ -30258,9 +30423,6 @@
           </a:p>
           <a:p>
             <a:pPr eaLnBrk="0" hangingPunct="0">
-              <a:lnSpc>
-                <a:spcPct val="100000"/>
-              </a:lnSpc>
               <a:spcBef>
                 <a:spcPts val="0"/>
               </a:spcBef>
@@ -30289,9 +30451,6 @@
           </a:p>
           <a:p>
             <a:pPr eaLnBrk="0" hangingPunct="0">
-              <a:lnSpc>
-                <a:spcPct val="100000"/>
-              </a:lnSpc>
               <a:spcBef>
                 <a:spcPts val="0"/>
               </a:spcBef>
@@ -30354,9 +30513,6 @@
           </a:p>
           <a:p>
             <a:pPr eaLnBrk="0" hangingPunct="0">
-              <a:lnSpc>
-                <a:spcPct val="100000"/>
-              </a:lnSpc>
               <a:spcBef>
                 <a:spcPts val="0"/>
               </a:spcBef>
@@ -30388,9 +30544,6 @@
           </a:p>
           <a:p>
             <a:pPr eaLnBrk="0" hangingPunct="0">
-              <a:lnSpc>
-                <a:spcPct val="100000"/>
-              </a:lnSpc>
               <a:spcBef>
                 <a:spcPts val="0"/>
               </a:spcBef>
@@ -30422,9 +30575,6 @@
           </a:p>
           <a:p>
             <a:pPr eaLnBrk="0" hangingPunct="0">
-              <a:lnSpc>
-                <a:spcPct val="100000"/>
-              </a:lnSpc>
               <a:spcBef>
                 <a:spcPts val="0"/>
               </a:spcBef>
@@ -30473,9 +30623,6 @@
           </a:p>
           <a:p>
             <a:pPr eaLnBrk="0" hangingPunct="0">
-              <a:lnSpc>
-                <a:spcPct val="100000"/>
-              </a:lnSpc>
               <a:spcBef>
                 <a:spcPts val="0"/>
               </a:spcBef>
@@ -30557,9 +30704,6 @@
           </a:p>
           <a:p>
             <a:pPr eaLnBrk="0" hangingPunct="0">
-              <a:lnSpc>
-                <a:spcPct val="100000"/>
-              </a:lnSpc>
               <a:spcBef>
                 <a:spcPts val="0"/>
               </a:spcBef>
@@ -30591,9 +30735,6 @@
           </a:p>
           <a:p>
             <a:pPr eaLnBrk="0" hangingPunct="0">
-              <a:lnSpc>
-                <a:spcPct val="100000"/>
-              </a:lnSpc>
               <a:spcBef>
                 <a:spcPts val="0"/>
               </a:spcBef>
@@ -30639,9 +30780,6 @@
           </a:p>
           <a:p>
             <a:pPr eaLnBrk="0" hangingPunct="0">
-              <a:lnSpc>
-                <a:spcPct val="100000"/>
-              </a:lnSpc>
               <a:spcBef>
                 <a:spcPts val="0"/>
               </a:spcBef>
@@ -30673,9 +30811,6 @@
           </a:p>
           <a:p>
             <a:pPr eaLnBrk="0" hangingPunct="0">
-              <a:lnSpc>
-                <a:spcPct val="100000"/>
-              </a:lnSpc>
               <a:spcBef>
                 <a:spcPts val="0"/>
               </a:spcBef>
@@ -30941,7 +31076,11 @@
           <a:bodyPr/>
           <a:lstStyle/>
           <a:p>
-            <a:pPr marL="542925" indent="-542925"/>
+            <a:pPr marL="542925" indent="-542925">
+              <a:lnSpc>
+                <a:spcPct val="100000"/>
+              </a:lnSpc>
+            </a:pPr>
             <a:r>
               <a:rPr lang="en-US" dirty="0"/>
               <a:t>Framework Class Library is the standard .NET Framework </a:t>
@@ -37109,14 +37248,20 @@
       </p:sp>
       <p:pic>
         <p:nvPicPr>
-          <p:cNvPr id="14338" name="Picture 2" descr="http://blogs.aspitalia.com/img/m.casati/netframework4.0beta2visualstudio2010_1482c/vs2010-logo_2.gif"/>
+          <p:cNvPr id="1026" name="Picture 2"/>
           <p:cNvPicPr>
             <a:picLocks noChangeAspect="1" noChangeArrowheads="1"/>
           </p:cNvPicPr>
           <p:nvPr/>
         </p:nvPicPr>
         <p:blipFill>
-          <a:blip r:embed="rId3" cstate="print"/>
+          <a:blip r:embed="rId3">
+            <a:extLst>
+              <a:ext uri="{28A0092B-C50C-407E-A947-70E740481C1C}">
+                <a14:useLocalDpi xmlns:a14="http://schemas.microsoft.com/office/drawing/2010/main" val="0"/>
+              </a:ext>
+            </a:extLst>
+          </a:blip>
           <a:srcRect/>
           <a:stretch>
             <a:fillRect/>
@@ -37124,23 +37269,46 @@
         </p:blipFill>
         <p:spPr bwMode="auto">
           <a:xfrm>
-            <a:off x="2286000" y="1600200"/>
-            <a:ext cx="4456652" cy="1905000"/>
+            <a:off x="1824392" y="1293304"/>
+            <a:ext cx="5495216" cy="3050096"/>
           </a:xfrm>
-          <a:prstGeom prst="roundRect">
-            <a:avLst>
-              <a:gd name="adj" fmla="val 8594"/>
-            </a:avLst>
+          <a:prstGeom prst="rect">
+            <a:avLst/>
           </a:prstGeom>
-          <a:solidFill>
-            <a:srgbClr val="FFFFFF"/>
-          </a:solidFill>
+          <a:noFill/>
           <a:ln>
             <a:noFill/>
           </a:ln>
           <a:effectLst>
-            <a:reflection blurRad="12700" stA="38000" endPos="28000" dist="5000" dir="5400000" sy="-100000" algn="bl" rotWithShape="0"/>
+            <a:glow rad="12700">
+              <a:srgbClr val="FFFFFF">
+                <a:alpha val="17000"/>
+              </a:srgbClr>
+            </a:glow>
+            <a:outerShdw dist="35921" dir="2700000" algn="ctr" rotWithShape="0">
+              <a:schemeClr val="bg2"/>
+            </a:outerShdw>
+            <a:softEdge rad="114300"/>
           </a:effectLst>
+          <a:extLst>
+            <a:ext uri="{909E8E84-426E-40DD-AFC4-6F175D3DCCD1}">
+              <a14:hiddenFill xmlns:a14="http://schemas.microsoft.com/office/drawing/2010/main">
+                <a:solidFill>
+                  <a:schemeClr val="accent1"/>
+                </a:solidFill>
+              </a14:hiddenFill>
+            </a:ext>
+            <a:ext uri="{91240B29-F687-4F45-9708-019B960494DF}">
+              <a14:hiddenLine xmlns:a14="http://schemas.microsoft.com/office/drawing/2010/main" w="9525">
+                <a:solidFill>
+                  <a:schemeClr val="tx1"/>
+                </a:solidFill>
+                <a:miter lim="800000"/>
+                <a:headEnd/>
+                <a:tailEnd/>
+              </a14:hiddenLine>
+            </a:ext>
+          </a:extLst>
         </p:spPr>
       </p:pic>
     </p:spTree>
@@ -37618,6 +37786,13 @@
     <a:masterClrMapping/>
   </p:clrMapOvr>
   <p:transition/>
+  <p:timing>
+    <p:tnLst>
+      <p:par>
+        <p:cTn id="1" dur="indefinite" restart="never" nodeType="tmRoot"/>
+      </p:par>
+    </p:tnLst>
+  </p:timing>
 </p:sld>
 </file>
 
@@ -37681,7 +37856,7 @@
           <a:p>
             <a:pPr>
               <a:lnSpc>
-                <a:spcPts val="3600"/>
+                <a:spcPct val="100000"/>
               </a:lnSpc>
             </a:pPr>
             <a:r>
@@ -37692,7 +37867,7 @@
           <a:p>
             <a:pPr lvl="1">
               <a:lnSpc>
-                <a:spcPts val="3600"/>
+                <a:spcPct val="100000"/>
               </a:lnSpc>
             </a:pPr>
             <a:r>
@@ -37712,7 +37887,7 @@
           <a:p>
             <a:pPr>
               <a:lnSpc>
-                <a:spcPts val="3600"/>
+                <a:spcPct val="100000"/>
               </a:lnSpc>
             </a:pPr>
             <a:r>
@@ -37728,7 +37903,7 @@
           <a:p>
             <a:pPr>
               <a:lnSpc>
-                <a:spcPts val="3600"/>
+                <a:spcPct val="100000"/>
               </a:lnSpc>
             </a:pPr>
             <a:r>
@@ -37740,7 +37915,7 @@
           <a:p>
             <a:pPr lvl="1">
               <a:lnSpc>
-                <a:spcPts val="3600"/>
+                <a:spcPct val="100000"/>
               </a:lnSpc>
             </a:pPr>
             <a:r>
@@ -37751,7 +37926,7 @@
           <a:p>
             <a:pPr lvl="1">
               <a:lnSpc>
-                <a:spcPts val="3600"/>
+                <a:spcPct val="100000"/>
               </a:lnSpc>
             </a:pPr>
             <a:r>
@@ -37762,7 +37937,7 @@
           <a:p>
             <a:pPr lvl="1">
               <a:lnSpc>
-                <a:spcPts val="3600"/>
+                <a:spcPct val="100000"/>
               </a:lnSpc>
             </a:pPr>
             <a:r>
@@ -37778,7 +37953,7 @@
           <a:p>
             <a:pPr lvl="1">
               <a:lnSpc>
-                <a:spcPts val="3600"/>
+                <a:spcPct val="100000"/>
               </a:lnSpc>
             </a:pPr>
             <a:r>
@@ -37789,7 +37964,7 @@
           <a:p>
             <a:pPr>
               <a:lnSpc>
-                <a:spcPts val="3600"/>
+                <a:spcPct val="100000"/>
               </a:lnSpc>
             </a:pPr>
             <a:r>
@@ -38962,6 +39137,9 @@
           <a:lstStyle/>
           <a:p>
             <a:pPr marL="542925" indent="-542925">
+              <a:lnSpc>
+                <a:spcPct val="100000"/>
+              </a:lnSpc>
               <a:buSzPct val="90000"/>
               <a:buFont typeface="Wingdings" pitchFamily="2" charset="2"/>
               <a:buAutoNum type="arabicPeriod" startAt="7"/>
@@ -38978,6 +39156,9 @@
           </a:p>
           <a:p>
             <a:pPr marL="542925" indent="-542925">
+              <a:lnSpc>
+                <a:spcPct val="100000"/>
+              </a:lnSpc>
               <a:buSzPct val="90000"/>
               <a:buFont typeface="Wingdings" pitchFamily="2" charset="2"/>
               <a:buAutoNum type="arabicPeriod" startAt="7"/>
@@ -39001,6 +39182,9 @@
           </a:p>
           <a:p>
             <a:pPr marL="542925" indent="-542925">
+              <a:lnSpc>
+                <a:spcPct val="100000"/>
+              </a:lnSpc>
               <a:buSzPct val="90000"/>
               <a:buFont typeface="Wingdings" pitchFamily="2" charset="2"/>
               <a:buAutoNum type="arabicPeriod" startAt="7"/>
@@ -39020,6 +39204,9 @@
           </a:p>
           <a:p>
             <a:pPr marL="542925" indent="-542925">
+              <a:lnSpc>
+                <a:spcPct val="100000"/>
+              </a:lnSpc>
               <a:buSzPct val="90000"/>
               <a:buFont typeface="Wingdings" pitchFamily="2" charset="2"/>
               <a:buAutoNum type="arabicPeriod" startAt="7"/>
@@ -39047,6 +39234,9 @@
           </a:p>
           <a:p>
             <a:pPr marL="542925" indent="-542925">
+              <a:lnSpc>
+                <a:spcPct val="100000"/>
+              </a:lnSpc>
               <a:buSzPct val="90000"/>
               <a:buFont typeface="Wingdings" pitchFamily="2" charset="2"/>
               <a:buAutoNum type="arabicPeriod" startAt="7"/>
@@ -39619,7 +39809,11 @@
           <a:bodyPr/>
           <a:lstStyle/>
           <a:p>
-            <a:pPr lvl="1"/>
+            <a:pPr lvl="1">
+              <a:lnSpc>
+                <a:spcPct val="100000"/>
+              </a:lnSpc>
+            </a:pPr>
             <a:r>
               <a:rPr lang="en-US" dirty="0" smtClean="0"/>
               <a:t>The OS</a:t>
@@ -39654,7 +39848,11 @@
             </a:r>
           </a:p>
           <a:p>
-            <a:pPr lvl="1"/>
+            <a:pPr lvl="1">
+              <a:lnSpc>
+                <a:spcPct val="100000"/>
+              </a:lnSpc>
+            </a:pPr>
             <a:r>
               <a:rPr lang="en-US" dirty="0"/>
               <a:t>Provides to the applications some services (threads</a:t>
@@ -39678,7 +39876,11 @@
             <a:endParaRPr lang="bg-BG" dirty="0"/>
           </a:p>
           <a:p>
-            <a:pPr lvl="1"/>
+            <a:pPr lvl="1">
+              <a:lnSpc>
+                <a:spcPct val="100000"/>
+              </a:lnSpc>
+            </a:pPr>
             <a:r>
               <a:rPr lang="en-US" dirty="0"/>
               <a:t>CLR is a separate process </a:t>
@@ -40386,9 +40588,6 @@
           <a:lstStyle/>
           <a:p>
             <a:pPr marL="630238" lvl="1" indent="-273050" eaLnBrk="0" hangingPunct="0">
-              <a:lnSpc>
-                <a:spcPts val="3800"/>
-              </a:lnSpc>
               <a:spcBef>
                 <a:spcPts val="600"/>
               </a:spcBef>
@@ -40496,9 +40695,6 @@
           </a:p>
           <a:p>
             <a:pPr marL="630238" lvl="1" indent="-273050" eaLnBrk="0" hangingPunct="0">
-              <a:lnSpc>
-                <a:spcPts val="3800"/>
-              </a:lnSpc>
               <a:spcBef>
                 <a:spcPts val="600"/>
               </a:spcBef>

</xml_diff>